<commit_message>
14. Foreach in LINQ
</commit_message>
<xml_diff>
--- a/1. Document/Slides/14-Foreach.pptx
+++ b/1. Document/Slides/14-Foreach.pptx
@@ -210,7 +210,7 @@
           <a:p>
             <a:fld id="{749F7025-33D9-4E9F-9955-A14222A03D05}" type="datetimeFigureOut">
               <a:rPr lang="en-US" smtClean="0"/>
-              <a:t>8/29/2021</a:t>
+              <a:t>2/8/2025</a:t>
             </a:fld>
             <a:endParaRPr lang="en-US"/>
           </a:p>
@@ -605,6 +605,93 @@
           <a:bodyPr/>
           <a:lstStyle/>
           <a:p>
+            <a:r>
+              <a:rPr lang="en-US" dirty="0"/>
+              <a:t>- duyệt qua từng phần tử trong collection (list, dictional..)</a:t>
+            </a:r>
+          </a:p>
+        </p:txBody>
+      </p:sp>
+      <p:sp>
+        <p:nvSpPr>
+          <p:cNvPr id="4" name="Slide Number Placeholder 3"/>
+          <p:cNvSpPr>
+            <a:spLocks noGrp="1"/>
+          </p:cNvSpPr>
+          <p:nvPr>
+            <p:ph type="sldNum" sz="quarter" idx="5"/>
+          </p:nvPr>
+        </p:nvSpPr>
+        <p:spPr/>
+        <p:txBody>
+          <a:bodyPr/>
+          <a:lstStyle/>
+          <a:p>
+            <a:fld id="{46D3E3EA-CC6A-448F-83C3-9A526F33CF9E}" type="slidenum">
+              <a:rPr lang="en-US" smtClean="0"/>
+              <a:t>2</a:t>
+            </a:fld>
+            <a:endParaRPr lang="en-US"/>
+          </a:p>
+        </p:txBody>
+      </p:sp>
+    </p:spTree>
+    <p:extLst>
+      <p:ext uri="{BB962C8B-B14F-4D97-AF65-F5344CB8AC3E}">
+        <p14:creationId xmlns:p14="http://schemas.microsoft.com/office/powerpoint/2010/main" val="2489014266"/>
+      </p:ext>
+    </p:extLst>
+  </p:cSld>
+  <p:clrMapOvr>
+    <a:masterClrMapping/>
+  </p:clrMapOvr>
+</p:notes>
+</file>
+
+<file path=ppt/notesSlides/notesSlide3.xml><?xml version="1.0" encoding="utf-8"?>
+<p:notes xmlns:a="http://schemas.openxmlformats.org/drawingml/2006/main" xmlns:r="http://schemas.openxmlformats.org/officeDocument/2006/relationships" xmlns:p="http://schemas.openxmlformats.org/presentationml/2006/main">
+  <p:cSld>
+    <p:spTree>
+      <p:nvGrpSpPr>
+        <p:cNvPr id="1" name=""/>
+        <p:cNvGrpSpPr/>
+        <p:nvPr/>
+      </p:nvGrpSpPr>
+      <p:grpSpPr>
+        <a:xfrm>
+          <a:off x="0" y="0"/>
+          <a:ext cx="0" cy="0"/>
+          <a:chOff x="0" y="0"/>
+          <a:chExt cx="0" cy="0"/>
+        </a:xfrm>
+      </p:grpSpPr>
+      <p:sp>
+        <p:nvSpPr>
+          <p:cNvPr id="2" name="Slide Image Placeholder 1"/>
+          <p:cNvSpPr>
+            <a:spLocks noGrp="1" noRot="1" noChangeAspect="1"/>
+          </p:cNvSpPr>
+          <p:nvPr>
+            <p:ph type="sldImg"/>
+          </p:nvPr>
+        </p:nvSpPr>
+        <p:spPr/>
+      </p:sp>
+      <p:sp>
+        <p:nvSpPr>
+          <p:cNvPr id="3" name="Notes Placeholder 2"/>
+          <p:cNvSpPr>
+            <a:spLocks noGrp="1"/>
+          </p:cNvSpPr>
+          <p:nvPr>
+            <p:ph type="body" idx="1"/>
+          </p:nvPr>
+        </p:nvSpPr>
+        <p:spPr/>
+        <p:txBody>
+          <a:bodyPr/>
+          <a:lstStyle/>
+          <a:p>
             <a:endParaRPr lang="en-US"/>
           </a:p>
         </p:txBody>
@@ -824,7 +911,7 @@
           <a:p>
             <a:fld id="{1ADF62C2-72EA-4953-A1D6-568F980002B8}" type="datetimeFigureOut">
               <a:rPr lang="en-US" smtClean="0"/>
-              <a:t>8/29/2021</a:t>
+              <a:t>2/8/2025</a:t>
             </a:fld>
             <a:endParaRPr lang="en-US"/>
           </a:p>
@@ -992,7 +1079,7 @@
           <a:p>
             <a:fld id="{1ADF62C2-72EA-4953-A1D6-568F980002B8}" type="datetimeFigureOut">
               <a:rPr lang="en-US" smtClean="0"/>
-              <a:t>8/29/2021</a:t>
+              <a:t>2/8/2025</a:t>
             </a:fld>
             <a:endParaRPr lang="en-US"/>
           </a:p>
@@ -1170,7 +1257,7 @@
           <a:p>
             <a:fld id="{1ADF62C2-72EA-4953-A1D6-568F980002B8}" type="datetimeFigureOut">
               <a:rPr lang="en-US" smtClean="0"/>
-              <a:t>8/29/2021</a:t>
+              <a:t>2/8/2025</a:t>
             </a:fld>
             <a:endParaRPr lang="en-US"/>
           </a:p>
@@ -1802,7 +1889,7 @@
           <a:p>
             <a:fld id="{1ADF62C2-72EA-4953-A1D6-568F980002B8}" type="datetimeFigureOut">
               <a:rPr lang="en-US" smtClean="0"/>
-              <a:t>8/29/2021</a:t>
+              <a:t>2/8/2025</a:t>
             </a:fld>
             <a:endParaRPr lang="en-US"/>
           </a:p>
@@ -2087,7 +2174,7 @@
           <a:p>
             <a:fld id="{1ADF62C2-72EA-4953-A1D6-568F980002B8}" type="datetimeFigureOut">
               <a:rPr lang="en-US" smtClean="0"/>
-              <a:t>8/29/2021</a:t>
+              <a:t>2/8/2025</a:t>
             </a:fld>
             <a:endParaRPr lang="en-US"/>
           </a:p>
@@ -2506,7 +2593,7 @@
           <a:p>
             <a:fld id="{1ADF62C2-72EA-4953-A1D6-568F980002B8}" type="datetimeFigureOut">
               <a:rPr lang="en-US" smtClean="0"/>
-              <a:t>8/29/2021</a:t>
+              <a:t>2/8/2025</a:t>
             </a:fld>
             <a:endParaRPr lang="en-US"/>
           </a:p>
@@ -2623,7 +2710,7 @@
           <a:p>
             <a:fld id="{1ADF62C2-72EA-4953-A1D6-568F980002B8}" type="datetimeFigureOut">
               <a:rPr lang="en-US" smtClean="0"/>
-              <a:t>8/29/2021</a:t>
+              <a:t>2/8/2025</a:t>
             </a:fld>
             <a:endParaRPr lang="en-US"/>
           </a:p>
@@ -2718,7 +2805,7 @@
           <a:p>
             <a:fld id="{1ADF62C2-72EA-4953-A1D6-568F980002B8}" type="datetimeFigureOut">
               <a:rPr lang="en-US" smtClean="0"/>
-              <a:t>8/29/2021</a:t>
+              <a:t>2/8/2025</a:t>
             </a:fld>
             <a:endParaRPr lang="en-US"/>
           </a:p>
@@ -2993,7 +3080,7 @@
           <a:p>
             <a:fld id="{1ADF62C2-72EA-4953-A1D6-568F980002B8}" type="datetimeFigureOut">
               <a:rPr lang="en-US" smtClean="0"/>
-              <a:t>8/29/2021</a:t>
+              <a:t>2/8/2025</a:t>
             </a:fld>
             <a:endParaRPr lang="en-US"/>
           </a:p>
@@ -3245,7 +3332,7 @@
           <a:p>
             <a:fld id="{1ADF62C2-72EA-4953-A1D6-568F980002B8}" type="datetimeFigureOut">
               <a:rPr lang="en-US" smtClean="0"/>
-              <a:t>8/29/2021</a:t>
+              <a:t>2/8/2025</a:t>
             </a:fld>
             <a:endParaRPr lang="en-US"/>
           </a:p>
@@ -3456,7 +3543,7 @@
           <a:p>
             <a:fld id="{1ADF62C2-72EA-4953-A1D6-568F980002B8}" type="datetimeFigureOut">
               <a:rPr lang="en-US" smtClean="0"/>
-              <a:t>8/29/2021</a:t>
+              <a:t>2/8/2025</a:t>
             </a:fld>
             <a:endParaRPr lang="en-US"/>
           </a:p>
@@ -4591,7 +4678,7 @@
           <p:nvPr/>
         </p:nvPicPr>
         <p:blipFill>
-          <a:blip r:embed="rId2">
+          <a:blip r:embed="rId3">
             <a:extLst>
               <a:ext uri="{28A0092B-C50C-407E-A947-70E740481C1C}">
                 <a14:useLocalDpi xmlns:a14="http://schemas.microsoft.com/office/drawing/2010/main" val="0"/>

</xml_diff>